<commit_message>
update tm 2 lesson links and small comment edits
</commit_message>
<xml_diff>
--- a/Lessons/L_Text_Mining_2/A_TM_review.pptx
+++ b/Lessons/L_Text_Mining_2/A_TM_review.pptx
@@ -5,17 +5,16 @@
     <p:sldMasterId id="2147483660" r:id="rId1"/>
   </p:sldMasterIdLst>
   <p:notesMasterIdLst>
-    <p:notesMasterId r:id="rId10"/>
+    <p:notesMasterId r:id="rId9"/>
   </p:notesMasterIdLst>
   <p:sldIdLst>
-    <p:sldId id="845" r:id="rId2"/>
-    <p:sldId id="297" r:id="rId3"/>
-    <p:sldId id="454" r:id="rId4"/>
-    <p:sldId id="455" r:id="rId5"/>
-    <p:sldId id="544" r:id="rId6"/>
-    <p:sldId id="466" r:id="rId7"/>
-    <p:sldId id="477" r:id="rId8"/>
-    <p:sldId id="545" r:id="rId9"/>
+    <p:sldId id="297" r:id="rId2"/>
+    <p:sldId id="454" r:id="rId3"/>
+    <p:sldId id="455" r:id="rId4"/>
+    <p:sldId id="544" r:id="rId5"/>
+    <p:sldId id="466" r:id="rId6"/>
+    <p:sldId id="477" r:id="rId7"/>
+    <p:sldId id="545" r:id="rId8"/>
   </p:sldIdLst>
   <p:sldSz cx="9144000" cy="6858000" type="screen4x3"/>
   <p:notesSz cx="7010400" cy="9296400"/>
@@ -215,7 +214,7 @@
           <a:p>
             <a:fld id="{B0C0A60C-850A-4EA4-9C14-A8FE98B94505}" type="datetimeFigureOut">
               <a:rPr lang="en-US" smtClean="0"/>
-              <a:t>11/25/24</a:t>
+              <a:t>4/28/25</a:t>
             </a:fld>
             <a:endParaRPr lang="en-US"/>
           </a:p>
@@ -614,7 +613,7 @@
           <a:p>
             <a:fld id="{5738B90E-0779-4C36-915C-6F05FCD89456}" type="datetime1">
               <a:rPr lang="en-US" smtClean="0"/>
-              <a:t>11/25/24</a:t>
+              <a:t>4/28/25</a:t>
             </a:fld>
             <a:endParaRPr lang="en-US"/>
           </a:p>
@@ -832,7 +831,7 @@
           <a:p>
             <a:fld id="{7B9EA29D-D431-42FE-B7B6-AAE4454C77D3}" type="datetime1">
               <a:rPr lang="en-US" smtClean="0"/>
-              <a:t>11/25/24</a:t>
+              <a:t>4/28/25</a:t>
             </a:fld>
             <a:endParaRPr lang="en-US"/>
           </a:p>
@@ -1092,7 +1091,7 @@
           <a:p>
             <a:fld id="{690D8A1E-EA8F-46C1-B891-AE0C00D9C314}" type="datetime1">
               <a:rPr lang="en-US" smtClean="0"/>
-              <a:t>11/25/24</a:t>
+              <a:t>4/28/25</a:t>
             </a:fld>
             <a:endParaRPr lang="en-US"/>
           </a:p>
@@ -1386,7 +1385,7 @@
           <a:p>
             <a:fld id="{D753EFC8-4232-4598-94F6-94C0EBAFC469}" type="datetime1">
               <a:rPr lang="en-US" smtClean="0"/>
-              <a:t>11/25/24</a:t>
+              <a:t>4/28/25</a:t>
             </a:fld>
             <a:endParaRPr lang="en-US"/>
           </a:p>
@@ -1701,7 +1700,7 @@
           <a:p>
             <a:fld id="{F3161074-1C18-4AE7-957D-F18524378C85}" type="datetime1">
               <a:rPr lang="en-US" smtClean="0"/>
-              <a:t>11/25/24</a:t>
+              <a:t>4/28/25</a:t>
             </a:fld>
             <a:endParaRPr lang="en-US"/>
           </a:p>
@@ -1975,7 +1974,7 @@
           <a:p>
             <a:fld id="{69BE256C-8D9A-4404-B47D-41A1AE514425}" type="datetime1">
               <a:rPr lang="en-US" smtClean="0"/>
-              <a:t>11/25/24</a:t>
+              <a:t>4/28/25</a:t>
             </a:fld>
             <a:endParaRPr lang="en-US"/>
           </a:p>
@@ -2409,7 +2408,7 @@
           <a:p>
             <a:fld id="{66CB2154-9035-4012-8189-BAAB61C5A5EE}" type="datetime1">
               <a:rPr lang="en-US" smtClean="0"/>
-              <a:t>11/25/24</a:t>
+              <a:t>4/28/25</a:t>
             </a:fld>
             <a:endParaRPr lang="en-US"/>
           </a:p>
@@ -2583,7 +2582,7 @@
           <a:p>
             <a:fld id="{6700A58B-DD98-43D0-B791-721480A02982}" type="datetime1">
               <a:rPr lang="en-US" smtClean="0"/>
-              <a:t>11/25/24</a:t>
+              <a:t>4/28/25</a:t>
             </a:fld>
             <a:endParaRPr lang="en-US"/>
           </a:p>
@@ -2775,7 +2774,7 @@
           <a:p>
             <a:fld id="{7DB6E382-4F61-4E24-BE1A-377EC83D0E3A}" type="datetime1">
               <a:rPr lang="en-US" smtClean="0"/>
-              <a:t>11/25/24</a:t>
+              <a:t>4/28/25</a:t>
             </a:fld>
             <a:endParaRPr lang="en-US"/>
           </a:p>
@@ -3086,7 +3085,7 @@
           <a:p>
             <a:fld id="{4142EED6-FC16-45B9-B8C4-2BC5DBA88325}" type="datetime1">
               <a:rPr lang="en-US" smtClean="0"/>
-              <a:t>11/25/24</a:t>
+              <a:t>4/28/25</a:t>
             </a:fld>
             <a:endParaRPr lang="en-US"/>
           </a:p>
@@ -3404,7 +3403,7 @@
           <a:p>
             <a:fld id="{DF59512B-4F1D-43D7-8819-2F53FEF69650}" type="datetime1">
               <a:rPr lang="en-US" smtClean="0"/>
-              <a:t>11/25/24</a:t>
+              <a:t>4/28/25</a:t>
             </a:fld>
             <a:endParaRPr lang="en-US"/>
           </a:p>
@@ -3680,7 +3679,7 @@
           <a:p>
             <a:fld id="{08437B94-E2BF-44DC-ADC5-B05FC9934E9D}" type="datetime1">
               <a:rPr lang="en-US" smtClean="0"/>
-              <a:t>11/25/24</a:t>
+              <a:t>4/28/25</a:t>
             </a:fld>
             <a:endParaRPr lang="en-US"/>
           </a:p>
@@ -4126,10 +4125,10 @@
       </p:grpSpPr>
       <p:sp>
         <p:nvSpPr>
-          <p:cNvPr id="2" name="Date Placeholder 1">
+          <p:cNvPr id="2" name="Title 1">
             <a:extLst>
               <a:ext uri="{FF2B5EF4-FFF2-40B4-BE49-F238E27FC236}">
-                <a16:creationId xmlns:a16="http://schemas.microsoft.com/office/drawing/2014/main" id="{5683B350-DCA1-3D8E-F95C-4A805D749433}"/>
+                <a16:creationId xmlns:a16="http://schemas.microsoft.com/office/drawing/2014/main" id="{167A20D1-C38F-40A5-B020-EBD3D0FC1155}"/>
               </a:ext>
             </a:extLst>
           </p:cNvPr>
@@ -4137,7 +4136,7 @@
             <a:spLocks noGrp="1"/>
           </p:cNvSpPr>
           <p:nvPr>
-            <p:ph type="dt" sz="half" idx="10"/>
+            <p:ph type="ctrTitle"/>
           </p:nvPr>
         </p:nvSpPr>
         <p:spPr/>
@@ -4145,20 +4144,19 @@
           <a:bodyPr/>
           <a:lstStyle/>
           <a:p>
-            <a:fld id="{6700A58B-DD98-43D0-B791-721480A02982}" type="datetime1">
-              <a:rPr lang="en-US" smtClean="0"/>
-              <a:t>11/25/24</a:t>
-            </a:fld>
-            <a:endParaRPr lang="en-US"/>
-          </a:p>
-        </p:txBody>
-      </p:sp>
-      <p:sp>
-        <p:nvSpPr>
-          <p:cNvPr id="3" name="Title 2">
+            <a:r>
+              <a:rPr lang="en-US" dirty="0"/>
+              <a:t>Text Mining</a:t>
+            </a:r>
+          </a:p>
+        </p:txBody>
+      </p:sp>
+      <p:sp>
+        <p:nvSpPr>
+          <p:cNvPr id="4" name="Date Placeholder 3">
             <a:extLst>
               <a:ext uri="{FF2B5EF4-FFF2-40B4-BE49-F238E27FC236}">
-                <a16:creationId xmlns:a16="http://schemas.microsoft.com/office/drawing/2014/main" id="{060E1376-58B4-66C7-8B1B-AC9C287F3457}"/>
+                <a16:creationId xmlns:a16="http://schemas.microsoft.com/office/drawing/2014/main" id="{8909B2EE-DD66-4058-A696-AC289906954A}"/>
               </a:ext>
             </a:extLst>
           </p:cNvPr>
@@ -4166,7 +4164,7 @@
             <a:spLocks noGrp="1"/>
           </p:cNvSpPr>
           <p:nvPr>
-            <p:ph type="title"/>
+            <p:ph type="dt" sz="half" idx="10"/>
           </p:nvPr>
         </p:nvSpPr>
         <p:spPr/>
@@ -4174,19 +4172,20 @@
           <a:bodyPr/>
           <a:lstStyle/>
           <a:p>
-            <a:r>
-              <a:rPr lang="en-US" dirty="0"/>
-              <a:t>Thanksgiving break is ruined…thanks Prof K!</a:t>
-            </a:r>
-          </a:p>
-        </p:txBody>
-      </p:sp>
-      <p:sp>
-        <p:nvSpPr>
-          <p:cNvPr id="4" name="Footer Placeholder 3">
+            <a:fld id="{5738B90E-0779-4C36-915C-6F05FCD89456}" type="datetime1">
+              <a:rPr lang="en-US" smtClean="0"/>
+              <a:t>4/28/25</a:t>
+            </a:fld>
+            <a:endParaRPr lang="en-US" dirty="0"/>
+          </a:p>
+        </p:txBody>
+      </p:sp>
+      <p:sp>
+        <p:nvSpPr>
+          <p:cNvPr id="5" name="Slide Number Placeholder 4">
             <a:extLst>
               <a:ext uri="{FF2B5EF4-FFF2-40B4-BE49-F238E27FC236}">
-                <a16:creationId xmlns:a16="http://schemas.microsoft.com/office/drawing/2014/main" id="{A0E7DE27-8975-203D-EB2E-CA7E7D2A7A33}"/>
+                <a16:creationId xmlns:a16="http://schemas.microsoft.com/office/drawing/2014/main" id="{A46ACE7D-882D-448A-8D8E-544494B44B9F}"/>
               </a:ext>
             </a:extLst>
           </p:cNvPr>
@@ -4194,7 +4193,7 @@
             <a:spLocks noGrp="1"/>
           </p:cNvSpPr>
           <p:nvPr>
-            <p:ph type="ftr" sz="quarter" idx="3"/>
+            <p:ph type="sldNum" sz="quarter" idx="12"/>
           </p:nvPr>
         </p:nvSpPr>
         <p:spPr/>
@@ -4202,20 +4201,20 @@
           <a:bodyPr/>
           <a:lstStyle/>
           <a:p>
-            <a:r>
-              <a:rPr lang="en-US"/>
-              <a:t>Kwartler</a:t>
-            </a:r>
+            <a:fld id="{37290FF7-652B-4475-AEAB-8B1A5D23AE09}" type="slidenum">
+              <a:rPr lang="en-US" smtClean="0"/>
+              <a:t>1</a:t>
+            </a:fld>
             <a:endParaRPr lang="en-US" dirty="0"/>
           </a:p>
         </p:txBody>
       </p:sp>
       <p:sp>
         <p:nvSpPr>
-          <p:cNvPr id="5" name="Slide Number Placeholder 4">
+          <p:cNvPr id="6" name="Footer Placeholder 5">
             <a:extLst>
               <a:ext uri="{FF2B5EF4-FFF2-40B4-BE49-F238E27FC236}">
-                <a16:creationId xmlns:a16="http://schemas.microsoft.com/office/drawing/2014/main" id="{567EC939-82D1-EA98-4E77-CBAB02E843CA}"/>
+                <a16:creationId xmlns:a16="http://schemas.microsoft.com/office/drawing/2014/main" id="{31E96655-E1DA-41A3-90E3-F63E0ECB1AE6}"/>
               </a:ext>
             </a:extLst>
           </p:cNvPr>
@@ -4223,509 +4222,17 @@
             <a:spLocks noGrp="1"/>
           </p:cNvSpPr>
           <p:nvPr>
-            <p:ph type="sldNum" sz="quarter" idx="4"/>
-          </p:nvPr>
-        </p:nvSpPr>
-        <p:spPr>
-          <a:xfrm>
-            <a:off x="7245743" y="6356351"/>
-            <a:ext cx="857250" cy="365125"/>
-          </a:xfrm>
-          <a:prstGeom prst="rect">
-            <a:avLst/>
-          </a:prstGeom>
-        </p:spPr>
+            <p:ph type="ftr" sz="quarter" idx="3"/>
+          </p:nvPr>
+        </p:nvSpPr>
+        <p:spPr/>
         <p:txBody>
           <a:bodyPr/>
-          <a:lstStyle>
-            <a:defPPr>
-              <a:defRPr lang="en-US"/>
-            </a:defPPr>
-            <a:lvl1pPr marL="0" algn="l" defTabSz="914400" rtl="0" eaLnBrk="1" latinLnBrk="0" hangingPunct="1">
-              <a:lnSpc>
-                <a:spcPct val="200000"/>
-              </a:lnSpc>
-              <a:defRPr lang="en-US" sz="900" kern="1200" smtClean="0">
-                <a:solidFill>
-                  <a:schemeClr val="tx1">
-                    <a:tint val="75000"/>
-                  </a:schemeClr>
-                </a:solidFill>
-                <a:latin typeface="+mn-lt"/>
-                <a:ea typeface="+mn-ea"/>
-                <a:cs typeface="+mn-cs"/>
-              </a:defRPr>
-            </a:lvl1pPr>
-            <a:lvl2pPr marL="457200" algn="l" defTabSz="914400" rtl="0" eaLnBrk="1" latinLnBrk="0" hangingPunct="1">
-              <a:defRPr sz="1800" kern="1200">
-                <a:solidFill>
-                  <a:schemeClr val="tx1"/>
-                </a:solidFill>
-                <a:latin typeface="+mn-lt"/>
-                <a:ea typeface="+mn-ea"/>
-                <a:cs typeface="+mn-cs"/>
-              </a:defRPr>
-            </a:lvl2pPr>
-            <a:lvl3pPr marL="914400" algn="l" defTabSz="914400" rtl="0" eaLnBrk="1" latinLnBrk="0" hangingPunct="1">
-              <a:defRPr sz="1800" kern="1200">
-                <a:solidFill>
-                  <a:schemeClr val="tx1"/>
-                </a:solidFill>
-                <a:latin typeface="+mn-lt"/>
-                <a:ea typeface="+mn-ea"/>
-                <a:cs typeface="+mn-cs"/>
-              </a:defRPr>
-            </a:lvl3pPr>
-            <a:lvl4pPr marL="1371600" algn="l" defTabSz="914400" rtl="0" eaLnBrk="1" latinLnBrk="0" hangingPunct="1">
-              <a:defRPr sz="1800" kern="1200">
-                <a:solidFill>
-                  <a:schemeClr val="tx1"/>
-                </a:solidFill>
-                <a:latin typeface="+mn-lt"/>
-                <a:ea typeface="+mn-ea"/>
-                <a:cs typeface="+mn-cs"/>
-              </a:defRPr>
-            </a:lvl4pPr>
-            <a:lvl5pPr marL="1828800" algn="l" defTabSz="914400" rtl="0" eaLnBrk="1" latinLnBrk="0" hangingPunct="1">
-              <a:defRPr sz="1800" kern="1200">
-                <a:solidFill>
-                  <a:schemeClr val="tx1"/>
-                </a:solidFill>
-                <a:latin typeface="+mn-lt"/>
-                <a:ea typeface="+mn-ea"/>
-                <a:cs typeface="+mn-cs"/>
-              </a:defRPr>
-            </a:lvl5pPr>
-            <a:lvl6pPr marL="2286000" algn="l" defTabSz="914400" rtl="0" eaLnBrk="1" latinLnBrk="0" hangingPunct="1">
-              <a:defRPr sz="1800" kern="1200">
-                <a:solidFill>
-                  <a:schemeClr val="tx1"/>
-                </a:solidFill>
-                <a:latin typeface="+mn-lt"/>
-                <a:ea typeface="+mn-ea"/>
-                <a:cs typeface="+mn-cs"/>
-              </a:defRPr>
-            </a:lvl6pPr>
-            <a:lvl7pPr marL="2743200" algn="l" defTabSz="914400" rtl="0" eaLnBrk="1" latinLnBrk="0" hangingPunct="1">
-              <a:defRPr sz="1800" kern="1200">
-                <a:solidFill>
-                  <a:schemeClr val="tx1"/>
-                </a:solidFill>
-                <a:latin typeface="+mn-lt"/>
-                <a:ea typeface="+mn-ea"/>
-                <a:cs typeface="+mn-cs"/>
-              </a:defRPr>
-            </a:lvl7pPr>
-            <a:lvl8pPr marL="3200400" algn="l" defTabSz="914400" rtl="0" eaLnBrk="1" latinLnBrk="0" hangingPunct="1">
-              <a:defRPr sz="1800" kern="1200">
-                <a:solidFill>
-                  <a:schemeClr val="tx1"/>
-                </a:solidFill>
-                <a:latin typeface="+mn-lt"/>
-                <a:ea typeface="+mn-ea"/>
-                <a:cs typeface="+mn-cs"/>
-              </a:defRPr>
-            </a:lvl8pPr>
-            <a:lvl9pPr marL="3657600" algn="l" defTabSz="914400" rtl="0" eaLnBrk="1" latinLnBrk="0" hangingPunct="1">
-              <a:defRPr sz="1800" kern="1200">
-                <a:solidFill>
-                  <a:schemeClr val="tx1"/>
-                </a:solidFill>
-                <a:latin typeface="+mn-lt"/>
-                <a:ea typeface="+mn-ea"/>
-                <a:cs typeface="+mn-cs"/>
-              </a:defRPr>
-            </a:lvl9pPr>
-          </a:lstStyle>
-          <a:p>
-            <a:fld id="{37290FF7-652B-4475-AEAB-8B1A5D23AE09}" type="slidenum">
-              <a:rPr lang="en-US" smtClean="0"/>
-              <a:pPr/>
-              <a:t>1</a:t>
-            </a:fld>
-            <a:endParaRPr lang="en-US" dirty="0"/>
-          </a:p>
-        </p:txBody>
-      </p:sp>
-      <p:pic>
-        <p:nvPicPr>
-          <p:cNvPr id="1026" name="Picture 2" descr="20 Hilarious Turkey Day Pictures, Cartoons, and Memes | Funny thanksgiving  images, Funny thanksgiving pictures, Happy thanksgiving memes">
-            <a:extLst>
-              <a:ext uri="{FF2B5EF4-FFF2-40B4-BE49-F238E27FC236}">
-                <a16:creationId xmlns:a16="http://schemas.microsoft.com/office/drawing/2014/main" id="{8B6AE5D5-B6C8-67BF-87E8-7C00BE7D2864}"/>
-              </a:ext>
-            </a:extLst>
-          </p:cNvPr>
-          <p:cNvPicPr>
-            <a:picLocks noChangeAspect="1" noChangeArrowheads="1"/>
-          </p:cNvPicPr>
-          <p:nvPr/>
-        </p:nvPicPr>
-        <p:blipFill>
-          <a:blip r:embed="rId2">
-            <a:extLst>
-              <a:ext uri="{28A0092B-C50C-407E-A947-70E740481C1C}">
-                <a14:useLocalDpi xmlns:a14="http://schemas.microsoft.com/office/drawing/2010/main" val="0"/>
-              </a:ext>
-            </a:extLst>
-          </a:blip>
-          <a:srcRect/>
-          <a:stretch>
-            <a:fillRect/>
-          </a:stretch>
-        </p:blipFill>
-        <p:spPr bwMode="auto">
-          <a:xfrm>
-            <a:off x="493478" y="2683336"/>
-            <a:ext cx="3225081" cy="2242439"/>
-          </a:xfrm>
-          <a:prstGeom prst="rect">
-            <a:avLst/>
-          </a:prstGeom>
-          <a:noFill/>
-          <a:extLst>
-            <a:ext uri="{909E8E84-426E-40DD-AFC4-6F175D3DCCD1}">
-              <a14:hiddenFill xmlns:a14="http://schemas.microsoft.com/office/drawing/2010/main">
-                <a:solidFill>
-                  <a:srgbClr val="FFFFFF"/>
-                </a:solidFill>
-              </a14:hiddenFill>
-            </a:ext>
-          </a:extLst>
-        </p:spPr>
-      </p:pic>
-      <p:sp>
-        <p:nvSpPr>
-          <p:cNvPr id="6" name="TextBox 5">
-            <a:extLst>
-              <a:ext uri="{FF2B5EF4-FFF2-40B4-BE49-F238E27FC236}">
-                <a16:creationId xmlns:a16="http://schemas.microsoft.com/office/drawing/2014/main" id="{98B0435C-28AB-2A1B-F497-07837745FCE2}"/>
-              </a:ext>
-            </a:extLst>
-          </p:cNvPr>
-          <p:cNvSpPr txBox="1"/>
-          <p:nvPr/>
-        </p:nvSpPr>
-        <p:spPr>
-          <a:xfrm>
-            <a:off x="4474464" y="1304544"/>
-            <a:ext cx="4401312" cy="1554272"/>
-          </a:xfrm>
-          <a:prstGeom prst="rect">
-            <a:avLst/>
-          </a:prstGeom>
-          <a:noFill/>
-        </p:spPr>
-        <p:txBody>
-          <a:bodyPr wrap="square" rtlCol="0">
-            <a:spAutoFit/>
-          </a:bodyPr>
           <a:lstStyle/>
           <a:p>
             <a:r>
-              <a:rPr lang="en-US" dirty="0">
-                <a:highlight>
-                  <a:srgbClr val="FFFF00"/>
-                </a:highlight>
-              </a:rPr>
-              <a:t>Case 3</a:t>
-            </a:r>
-          </a:p>
-          <a:p>
-            <a:pPr marL="65088" indent="-57150">
-              <a:buFont typeface="Arial" panose="020B0604020202020204" pitchFamily="34" charset="0"/>
-              <a:buChar char="•"/>
-            </a:pPr>
-            <a:r>
-              <a:rPr lang="en-US" sz="1050" dirty="0"/>
-              <a:t>This is a regression case, rf, dt, </a:t>
-            </a:r>
-            <a:r>
-              <a:rPr lang="en-US" sz="1050" dirty="0" err="1"/>
-              <a:t>lm</a:t>
-            </a:r>
-            <a:r>
-              <a:rPr lang="en-US" sz="1050" dirty="0"/>
-              <a:t> and others can be applied</a:t>
-            </a:r>
-          </a:p>
-          <a:p>
-            <a:pPr marL="65088" indent="-57150">
-              <a:buFont typeface="Arial" panose="020B0604020202020204" pitchFamily="34" charset="0"/>
-              <a:buChar char="•"/>
-            </a:pPr>
-            <a:r>
-              <a:rPr lang="en-US" sz="1050" dirty="0"/>
-              <a:t>RMSE and MAPE are appropriate</a:t>
-            </a:r>
-          </a:p>
-          <a:p>
-            <a:pPr marL="65088" indent="-57150">
-              <a:buFont typeface="Arial" panose="020B0604020202020204" pitchFamily="34" charset="0"/>
-              <a:buChar char="•"/>
-            </a:pPr>
-            <a:r>
-              <a:rPr lang="en-US" sz="1050" dirty="0"/>
-              <a:t>EDA is still important!</a:t>
-            </a:r>
-          </a:p>
-          <a:p>
-            <a:pPr marL="65088" indent="-57150">
-              <a:buFont typeface="Arial" panose="020B0604020202020204" pitchFamily="34" charset="0"/>
-              <a:buChar char="•"/>
-            </a:pPr>
-            <a:r>
-              <a:rPr lang="en-US" sz="1050" dirty="0"/>
-              <a:t>Code consistency, logical flow, avoiding redundant objects are important</a:t>
-            </a:r>
-          </a:p>
-          <a:p>
-            <a:pPr marL="65088" indent="-57150">
-              <a:buFont typeface="Arial" panose="020B0604020202020204" pitchFamily="34" charset="0"/>
-              <a:buChar char="•"/>
-            </a:pPr>
-            <a:r>
-              <a:rPr lang="en-US" sz="1050" dirty="0"/>
-              <a:t>Tone, volume, cadence and limited use of filler words are important</a:t>
-            </a:r>
-          </a:p>
-          <a:p>
-            <a:pPr marL="65088" indent="-57150">
-              <a:buFont typeface="Arial" panose="020B0604020202020204" pitchFamily="34" charset="0"/>
-              <a:buChar char="•"/>
-            </a:pPr>
-            <a:r>
-              <a:rPr lang="en-US" sz="1050" dirty="0"/>
-              <a:t>Agenda, problem statement, data description, EDA, Assessment are all important</a:t>
-            </a:r>
-          </a:p>
-        </p:txBody>
-      </p:sp>
-      <p:sp>
-        <p:nvSpPr>
-          <p:cNvPr id="8" name="TextBox 7">
-            <a:extLst>
-              <a:ext uri="{FF2B5EF4-FFF2-40B4-BE49-F238E27FC236}">
-                <a16:creationId xmlns:a16="http://schemas.microsoft.com/office/drawing/2014/main" id="{32E8C239-DA96-9DB4-54C6-E31E746BAA8E}"/>
-              </a:ext>
-            </a:extLst>
-          </p:cNvPr>
-          <p:cNvSpPr txBox="1"/>
-          <p:nvPr/>
-        </p:nvSpPr>
-        <p:spPr>
-          <a:xfrm>
-            <a:off x="493479" y="4869316"/>
-            <a:ext cx="3225080" cy="200055"/>
-          </a:xfrm>
-          <a:prstGeom prst="rect">
-            <a:avLst/>
-          </a:prstGeom>
-          <a:noFill/>
-        </p:spPr>
-        <p:txBody>
-          <a:bodyPr wrap="square">
-            <a:spAutoFit/>
-          </a:bodyPr>
-          <a:lstStyle/>
-          <a:p>
-            <a:r>
-              <a:rPr lang="en-US" sz="700" dirty="0">
-                <a:hlinkClick r:id="rId3"/>
-              </a:rPr>
-              <a:t>https://i.pinimg.com/736x/3a/38/19/3a38195c96de241560714610f32b8532.jpg</a:t>
-            </a:r>
-            <a:endParaRPr lang="en-US" sz="700" dirty="0"/>
-          </a:p>
-        </p:txBody>
-      </p:sp>
-      <p:sp>
-        <p:nvSpPr>
-          <p:cNvPr id="10" name="TextBox 9">
-            <a:extLst>
-              <a:ext uri="{FF2B5EF4-FFF2-40B4-BE49-F238E27FC236}">
-                <a16:creationId xmlns:a16="http://schemas.microsoft.com/office/drawing/2014/main" id="{4CF2C666-CA90-AE71-B9EE-EA862123F5E4}"/>
-              </a:ext>
-            </a:extLst>
-          </p:cNvPr>
-          <p:cNvSpPr txBox="1"/>
-          <p:nvPr/>
-        </p:nvSpPr>
-        <p:spPr>
-          <a:xfrm>
-            <a:off x="493478" y="1286213"/>
-            <a:ext cx="3225081" cy="1338828"/>
-          </a:xfrm>
-          <a:prstGeom prst="rect">
-            <a:avLst/>
-          </a:prstGeom>
-          <a:noFill/>
-          <a:ln>
-            <a:solidFill>
-              <a:schemeClr val="accent1"/>
-            </a:solidFill>
-          </a:ln>
-        </p:spPr>
-        <p:txBody>
-          <a:bodyPr wrap="square">
-            <a:spAutoFit/>
-          </a:bodyPr>
-          <a:lstStyle/>
-          <a:p>
-            <a:pPr algn="l" fontAlgn="t"/>
-            <a:r>
-              <a:rPr lang="en-US" b="0" i="0" dirty="0" err="1">
-                <a:solidFill>
-                  <a:srgbClr val="202124"/>
-                </a:solidFill>
-                <a:effectLst/>
-                <a:latin typeface="Google Sans"/>
-              </a:rPr>
-              <a:t>di·dac·tic</a:t>
-            </a:r>
-            <a:endParaRPr lang="en-US" b="0" i="0" dirty="0">
-              <a:solidFill>
-                <a:srgbClr val="202124"/>
-              </a:solidFill>
-              <a:effectLst/>
-              <a:latin typeface="Google Sans"/>
-            </a:endParaRPr>
-          </a:p>
-          <a:p>
-            <a:pPr algn="l"/>
-            <a:r>
-              <a:rPr lang="en-US" sz="1050" b="0" i="0" dirty="0">
-                <a:solidFill>
-                  <a:srgbClr val="202124"/>
-                </a:solidFill>
-                <a:effectLst/>
-                <a:latin typeface="Roboto" panose="02000000000000000000" pitchFamily="2" charset="0"/>
-              </a:rPr>
-              <a:t>/</a:t>
-            </a:r>
-            <a:r>
-              <a:rPr lang="en-US" sz="1050" b="0" i="0" dirty="0" err="1">
-                <a:solidFill>
-                  <a:srgbClr val="202124"/>
-                </a:solidFill>
-                <a:effectLst/>
-                <a:latin typeface="Roboto" panose="02000000000000000000" pitchFamily="2" charset="0"/>
-              </a:rPr>
-              <a:t>dīˈdaktik</a:t>
-            </a:r>
-            <a:r>
-              <a:rPr lang="en-US" sz="1050" b="0" i="0" dirty="0">
-                <a:solidFill>
-                  <a:srgbClr val="202124"/>
-                </a:solidFill>
-                <a:effectLst/>
-                <a:latin typeface="Roboto" panose="02000000000000000000" pitchFamily="2" charset="0"/>
-              </a:rPr>
-              <a:t>/</a:t>
-            </a:r>
-          </a:p>
-          <a:p>
-            <a:pPr algn="l">
-              <a:buFont typeface="Arial" panose="020B0604020202020204" pitchFamily="34" charset="0"/>
-              <a:buChar char="•"/>
-            </a:pPr>
-            <a:r>
-              <a:rPr lang="en-US" sz="1050" b="0" i="0" dirty="0">
-                <a:solidFill>
-                  <a:srgbClr val="202124"/>
-                </a:solidFill>
-                <a:effectLst/>
-                <a:latin typeface="Roboto" panose="02000000000000000000" pitchFamily="2" charset="0"/>
-              </a:rPr>
-              <a:t>in the manner of a teacher, particularly so as to treat someone in a patronizing way.</a:t>
-            </a:r>
-          </a:p>
-          <a:p>
-            <a:pPr algn="l">
-              <a:buFont typeface="Arial" panose="020B0604020202020204" pitchFamily="34" charset="0"/>
-              <a:buChar char="•"/>
-            </a:pPr>
-            <a:r>
-              <a:rPr lang="en-US" sz="1050" b="0" i="0" dirty="0">
-                <a:solidFill>
-                  <a:srgbClr val="70757A"/>
-                </a:solidFill>
-                <a:effectLst/>
-                <a:latin typeface="Roboto" panose="02000000000000000000" pitchFamily="2" charset="0"/>
-              </a:rPr>
-              <a:t>"</a:t>
-            </a:r>
-            <a:r>
-              <a:rPr lang="en-US" sz="1050" dirty="0">
-                <a:solidFill>
-                  <a:srgbClr val="70757A"/>
-                </a:solidFill>
-                <a:latin typeface="Roboto" panose="02000000000000000000" pitchFamily="2" charset="0"/>
-              </a:rPr>
-              <a:t>slow-paced, didactic lecturing”</a:t>
-            </a:r>
-          </a:p>
-          <a:p>
-            <a:pPr algn="l">
-              <a:buFont typeface="Arial" panose="020B0604020202020204" pitchFamily="34" charset="0"/>
-              <a:buChar char="•"/>
-            </a:pPr>
-            <a:r>
-              <a:rPr lang="en-US" sz="1050" dirty="0">
-                <a:solidFill>
-                  <a:srgbClr val="70757A"/>
-                </a:solidFill>
-                <a:latin typeface="Roboto" panose="02000000000000000000" pitchFamily="2" charset="0"/>
-              </a:rPr>
-              <a:t>“if it feels like the teaching is just telling you what to think explicitly, that's didactic in a bad way.”</a:t>
-            </a:r>
-          </a:p>
-        </p:txBody>
-      </p:sp>
-      <p:sp>
-        <p:nvSpPr>
-          <p:cNvPr id="12" name="TextBox 11">
-            <a:extLst>
-              <a:ext uri="{FF2B5EF4-FFF2-40B4-BE49-F238E27FC236}">
-                <a16:creationId xmlns:a16="http://schemas.microsoft.com/office/drawing/2014/main" id="{1C282028-919B-2597-DAD6-682774E9B3F0}"/>
-              </a:ext>
-            </a:extLst>
-          </p:cNvPr>
-          <p:cNvSpPr txBox="1"/>
-          <p:nvPr/>
-        </p:nvSpPr>
-        <p:spPr>
-          <a:xfrm>
-            <a:off x="615942" y="5995618"/>
-            <a:ext cx="8259834" cy="415498"/>
-          </a:xfrm>
-          <a:prstGeom prst="rect">
-            <a:avLst/>
-          </a:prstGeom>
-          <a:solidFill>
-            <a:schemeClr val="accent1"/>
-          </a:solidFill>
-          <a:ln>
-            <a:solidFill>
-              <a:schemeClr val="accent1"/>
-            </a:solidFill>
-          </a:ln>
-        </p:spPr>
-        <p:txBody>
-          <a:bodyPr wrap="square">
-            <a:spAutoFit/>
-          </a:bodyPr>
-          <a:lstStyle/>
-          <a:p>
-            <a:pPr algn="ctr" fontAlgn="t"/>
-            <a:r>
-              <a:rPr lang="en-US" sz="1050" dirty="0">
-                <a:solidFill>
-                  <a:schemeClr val="bg1"/>
-                </a:solidFill>
-                <a:latin typeface="Roboto" panose="02000000000000000000" pitchFamily="2" charset="0"/>
-              </a:rPr>
-              <a:t>This course is not didactic.  The real world is not slow-paced, or tells you expectations explicitly.  Bosses rarely if ever say I want A.  They give you an ambiguous problem statement, you must apply judgment, learn and try.  As you become an executive, this is more important.</a:t>
+              <a:rPr lang="en-US" dirty="0"/>
+              <a:t>Kwartler CSCI -96</a:t>
             </a:r>
           </a:p>
         </p:txBody>
@@ -4733,7 +4240,7 @@
     </p:spTree>
     <p:extLst>
       <p:ext uri="{BB962C8B-B14F-4D97-AF65-F5344CB8AC3E}">
-        <p14:creationId xmlns:p14="http://schemas.microsoft.com/office/powerpoint/2010/main" val="3326576635"/>
+        <p14:creationId xmlns:p14="http://schemas.microsoft.com/office/powerpoint/2010/main" val="2267810283"/>
       </p:ext>
     </p:extLst>
   </p:cSld>
@@ -4762,150 +4269,6 @@
       </p:grpSpPr>
       <p:sp>
         <p:nvSpPr>
-          <p:cNvPr id="2" name="Title 1">
-            <a:extLst>
-              <a:ext uri="{FF2B5EF4-FFF2-40B4-BE49-F238E27FC236}">
-                <a16:creationId xmlns:a16="http://schemas.microsoft.com/office/drawing/2014/main" id="{167A20D1-C38F-40A5-B020-EBD3D0FC1155}"/>
-              </a:ext>
-            </a:extLst>
-          </p:cNvPr>
-          <p:cNvSpPr>
-            <a:spLocks noGrp="1"/>
-          </p:cNvSpPr>
-          <p:nvPr>
-            <p:ph type="ctrTitle"/>
-          </p:nvPr>
-        </p:nvSpPr>
-        <p:spPr/>
-        <p:txBody>
-          <a:bodyPr/>
-          <a:lstStyle/>
-          <a:p>
-            <a:r>
-              <a:rPr lang="en-US" dirty="0"/>
-              <a:t>Text Mining</a:t>
-            </a:r>
-          </a:p>
-        </p:txBody>
-      </p:sp>
-      <p:sp>
-        <p:nvSpPr>
-          <p:cNvPr id="4" name="Date Placeholder 3">
-            <a:extLst>
-              <a:ext uri="{FF2B5EF4-FFF2-40B4-BE49-F238E27FC236}">
-                <a16:creationId xmlns:a16="http://schemas.microsoft.com/office/drawing/2014/main" id="{8909B2EE-DD66-4058-A696-AC289906954A}"/>
-              </a:ext>
-            </a:extLst>
-          </p:cNvPr>
-          <p:cNvSpPr>
-            <a:spLocks noGrp="1"/>
-          </p:cNvSpPr>
-          <p:nvPr>
-            <p:ph type="dt" sz="half" idx="10"/>
-          </p:nvPr>
-        </p:nvSpPr>
-        <p:spPr/>
-        <p:txBody>
-          <a:bodyPr/>
-          <a:lstStyle/>
-          <a:p>
-            <a:fld id="{5738B90E-0779-4C36-915C-6F05FCD89456}" type="datetime1">
-              <a:rPr lang="en-US" smtClean="0"/>
-              <a:t>11/25/24</a:t>
-            </a:fld>
-            <a:endParaRPr lang="en-US" dirty="0"/>
-          </a:p>
-        </p:txBody>
-      </p:sp>
-      <p:sp>
-        <p:nvSpPr>
-          <p:cNvPr id="5" name="Slide Number Placeholder 4">
-            <a:extLst>
-              <a:ext uri="{FF2B5EF4-FFF2-40B4-BE49-F238E27FC236}">
-                <a16:creationId xmlns:a16="http://schemas.microsoft.com/office/drawing/2014/main" id="{A46ACE7D-882D-448A-8D8E-544494B44B9F}"/>
-              </a:ext>
-            </a:extLst>
-          </p:cNvPr>
-          <p:cNvSpPr>
-            <a:spLocks noGrp="1"/>
-          </p:cNvSpPr>
-          <p:nvPr>
-            <p:ph type="sldNum" sz="quarter" idx="12"/>
-          </p:nvPr>
-        </p:nvSpPr>
-        <p:spPr/>
-        <p:txBody>
-          <a:bodyPr/>
-          <a:lstStyle/>
-          <a:p>
-            <a:fld id="{37290FF7-652B-4475-AEAB-8B1A5D23AE09}" type="slidenum">
-              <a:rPr lang="en-US" smtClean="0"/>
-              <a:t>2</a:t>
-            </a:fld>
-            <a:endParaRPr lang="en-US" dirty="0"/>
-          </a:p>
-        </p:txBody>
-      </p:sp>
-      <p:sp>
-        <p:nvSpPr>
-          <p:cNvPr id="6" name="Footer Placeholder 5">
-            <a:extLst>
-              <a:ext uri="{FF2B5EF4-FFF2-40B4-BE49-F238E27FC236}">
-                <a16:creationId xmlns:a16="http://schemas.microsoft.com/office/drawing/2014/main" id="{31E96655-E1DA-41A3-90E3-F63E0ECB1AE6}"/>
-              </a:ext>
-            </a:extLst>
-          </p:cNvPr>
-          <p:cNvSpPr>
-            <a:spLocks noGrp="1"/>
-          </p:cNvSpPr>
-          <p:nvPr>
-            <p:ph type="ftr" sz="quarter" idx="3"/>
-          </p:nvPr>
-        </p:nvSpPr>
-        <p:spPr/>
-        <p:txBody>
-          <a:bodyPr/>
-          <a:lstStyle/>
-          <a:p>
-            <a:r>
-              <a:rPr lang="en-US" dirty="0"/>
-              <a:t>Kwartler CSCI -96</a:t>
-            </a:r>
-          </a:p>
-        </p:txBody>
-      </p:sp>
-    </p:spTree>
-    <p:extLst>
-      <p:ext uri="{BB962C8B-B14F-4D97-AF65-F5344CB8AC3E}">
-        <p14:creationId xmlns:p14="http://schemas.microsoft.com/office/powerpoint/2010/main" val="2267810283"/>
-      </p:ext>
-    </p:extLst>
-  </p:cSld>
-  <p:clrMapOvr>
-    <a:masterClrMapping/>
-  </p:clrMapOvr>
-</p:sld>
-</file>
-
-<file path=ppt/slides/slide3.xml><?xml version="1.0" encoding="utf-8"?>
-<p:sld xmlns:a="http://schemas.openxmlformats.org/drawingml/2006/main" xmlns:r="http://schemas.openxmlformats.org/officeDocument/2006/relationships" xmlns:p="http://schemas.openxmlformats.org/presentationml/2006/main">
-  <p:cSld>
-    <p:spTree>
-      <p:nvGrpSpPr>
-        <p:cNvPr id="1" name=""/>
-        <p:cNvGrpSpPr/>
-        <p:nvPr/>
-      </p:nvGrpSpPr>
-      <p:grpSpPr>
-        <a:xfrm>
-          <a:off x="0" y="0"/>
-          <a:ext cx="0" cy="0"/>
-          <a:chOff x="0" y="0"/>
-          <a:chExt cx="0" cy="0"/>
-        </a:xfrm>
-      </p:grpSpPr>
-      <p:sp>
-        <p:nvSpPr>
           <p:cNvPr id="3" name="Text Placeholder 2"/>
           <p:cNvSpPr>
             <a:spLocks noGrp="1"/>
@@ -5031,7 +4394,7 @@
           <a:p>
             <a:fld id="{4142EED6-FC16-45B9-B8C4-2BC5DBA88325}" type="datetime1">
               <a:rPr lang="en-US" smtClean="0"/>
-              <a:t>11/25/24</a:t>
+              <a:t>4/28/25</a:t>
             </a:fld>
             <a:endParaRPr lang="en-US"/>
           </a:p>
@@ -5054,7 +4417,7 @@
           <a:p>
             <a:fld id="{37290FF7-652B-4475-AEAB-8B1A5D23AE09}" type="slidenum">
               <a:rPr lang="en-US" smtClean="0"/>
-              <a:t>3</a:t>
+              <a:t>2</a:t>
             </a:fld>
             <a:endParaRPr lang="en-US"/>
           </a:p>
@@ -5118,14 +4481,14 @@
           <a:effectLst/>
           <a:extLst>
             <a:ext uri="{909E8E84-426E-40dd-AFC4-6F175D3DCCD1}">
-              <a14:hiddenFill xmlns:a14="http://schemas.microsoft.com/office/drawing/2010/main" xmlns="">
+              <a14:hiddenFill xmlns="" xmlns:a14="http://schemas.microsoft.com/office/drawing/2010/main">
                 <a:solidFill>
                   <a:schemeClr val="accent1"/>
                 </a:solidFill>
               </a14:hiddenFill>
             </a:ext>
             <a:ext uri="{91240B29-F687-4f45-9708-019B960494DF}">
-              <a14:hiddenLine xmlns:a14="http://schemas.microsoft.com/office/drawing/2010/main" xmlns="" w="9525">
+              <a14:hiddenLine xmlns="" xmlns:a14="http://schemas.microsoft.com/office/drawing/2010/main" w="9525">
                 <a:solidFill>
                   <a:schemeClr val="tx1"/>
                 </a:solidFill>
@@ -5135,7 +4498,7 @@
               </a14:hiddenLine>
             </a:ext>
             <a:ext uri="{AF507438-7753-43e0-B8FC-AC1667EBCBE1}">
-              <a14:hiddenEffects xmlns:a14="http://schemas.microsoft.com/office/drawing/2010/main" xmlns="">
+              <a14:hiddenEffects xmlns="" xmlns:a14="http://schemas.microsoft.com/office/drawing/2010/main">
                 <a:effectLst>
                   <a:outerShdw dist="35921" dir="2700000" algn="ctr" rotWithShape="0">
                     <a:schemeClr val="bg2"/>
@@ -5237,7 +4600,7 @@
 </p:sld>
 </file>
 
-<file path=ppt/slides/slide4.xml><?xml version="1.0" encoding="utf-8"?>
+<file path=ppt/slides/slide3.xml><?xml version="1.0" encoding="utf-8"?>
 <p:sld xmlns:a="http://schemas.openxmlformats.org/drawingml/2006/main" xmlns:r="http://schemas.openxmlformats.org/officeDocument/2006/relationships" xmlns:p="http://schemas.openxmlformats.org/presentationml/2006/main">
   <p:cSld>
     <p:spTree>
@@ -5290,14 +4653,14 @@
           <a:effectLst/>
           <a:extLst>
             <a:ext uri="{909E8E84-426E-40dd-AFC4-6F175D3DCCD1}">
-              <a14:hiddenFill xmlns:a14="http://schemas.microsoft.com/office/drawing/2010/main" xmlns="">
+              <a14:hiddenFill xmlns="" xmlns:a14="http://schemas.microsoft.com/office/drawing/2010/main">
                 <a:solidFill>
                   <a:schemeClr val="accent1"/>
                 </a:solidFill>
               </a14:hiddenFill>
             </a:ext>
             <a:ext uri="{91240B29-F687-4f45-9708-019B960494DF}">
-              <a14:hiddenLine xmlns:a14="http://schemas.microsoft.com/office/drawing/2010/main" xmlns="" w="9525">
+              <a14:hiddenLine xmlns="" xmlns:a14="http://schemas.microsoft.com/office/drawing/2010/main" w="9525">
                 <a:solidFill>
                   <a:schemeClr val="tx1"/>
                 </a:solidFill>
@@ -5307,7 +4670,7 @@
               </a14:hiddenLine>
             </a:ext>
             <a:ext uri="{AF507438-7753-43e0-B8FC-AC1667EBCBE1}">
-              <a14:hiddenEffects xmlns:a14="http://schemas.microsoft.com/office/drawing/2010/main" xmlns="">
+              <a14:hiddenEffects xmlns="" xmlns:a14="http://schemas.microsoft.com/office/drawing/2010/main">
                 <a:effectLst>
                   <a:outerShdw dist="35921" dir="2700000" algn="ctr" rotWithShape="0">
                     <a:schemeClr val="bg2"/>
@@ -5445,7 +4808,7 @@
           <a:p>
             <a:fld id="{4142EED6-FC16-45B9-B8C4-2BC5DBA88325}" type="datetime1">
               <a:rPr lang="en-US" smtClean="0"/>
-              <a:t>11/25/24</a:t>
+              <a:t>4/28/25</a:t>
             </a:fld>
             <a:endParaRPr lang="en-US" dirty="0"/>
           </a:p>
@@ -5468,7 +4831,7 @@
           <a:p>
             <a:fld id="{37290FF7-652B-4475-AEAB-8B1A5D23AE09}" type="slidenum">
               <a:rPr lang="en-US" smtClean="0"/>
-              <a:t>4</a:t>
+              <a:t>3</a:t>
             </a:fld>
             <a:endParaRPr lang="en-US"/>
           </a:p>
@@ -5587,7 +4950,7 @@
 </p:sld>
 </file>
 
-<file path=ppt/slides/slide5.xml><?xml version="1.0" encoding="utf-8"?>
+<file path=ppt/slides/slide4.xml><?xml version="1.0" encoding="utf-8"?>
 <p:sld xmlns:a="http://schemas.openxmlformats.org/drawingml/2006/main" xmlns:r="http://schemas.openxmlformats.org/officeDocument/2006/relationships" xmlns:p="http://schemas.openxmlformats.org/presentationml/2006/main">
   <p:cSld>
     <p:spTree>
@@ -5627,7 +4990,7 @@
           <a:p>
             <a:fld id="{4142EED6-FC16-45B9-B8C4-2BC5DBA88325}" type="datetime1">
               <a:rPr lang="en-US" smtClean="0"/>
-              <a:t>11/25/24</a:t>
+              <a:t>4/28/25</a:t>
             </a:fld>
             <a:endParaRPr lang="en-US"/>
           </a:p>
@@ -5656,7 +5019,7 @@
           <a:p>
             <a:fld id="{37290FF7-652B-4475-AEAB-8B1A5D23AE09}" type="slidenum">
               <a:rPr lang="en-US" smtClean="0"/>
-              <a:t>5</a:t>
+              <a:t>4</a:t>
             </a:fld>
             <a:endParaRPr lang="en-US"/>
           </a:p>
@@ -6020,7 +5383,7 @@
 </p:sld>
 </file>
 
-<file path=ppt/slides/slide6.xml><?xml version="1.0" encoding="utf-8"?>
+<file path=ppt/slides/slide5.xml><?xml version="1.0" encoding="utf-8"?>
 <p:sld xmlns:a="http://schemas.openxmlformats.org/drawingml/2006/main" xmlns:r="http://schemas.openxmlformats.org/officeDocument/2006/relationships" xmlns:p="http://schemas.openxmlformats.org/presentationml/2006/main">
   <p:cSld>
     <p:spTree>
@@ -6054,7 +5417,7 @@
           <a:p>
             <a:fld id="{6700A58B-DD98-43D0-B791-721480A02982}" type="datetime1">
               <a:rPr lang="en-US" smtClean="0"/>
-              <a:t>11/25/24</a:t>
+              <a:t>4/28/25</a:t>
             </a:fld>
             <a:endParaRPr lang="en-US"/>
           </a:p>
@@ -6099,7 +5462,7 @@
           <a:p>
             <a:fld id="{37290FF7-652B-4475-AEAB-8B1A5D23AE09}" type="slidenum">
               <a:rPr lang="en-US" smtClean="0"/>
-              <a:t>6</a:t>
+              <a:t>5</a:t>
             </a:fld>
             <a:endParaRPr lang="en-US"/>
           </a:p>
@@ -6725,7 +6088,7 @@
 </p:sld>
 </file>
 
-<file path=ppt/slides/slide7.xml><?xml version="1.0" encoding="utf-8"?>
+<file path=ppt/slides/slide6.xml><?xml version="1.0" encoding="utf-8"?>
 <p:sld xmlns:a="http://schemas.openxmlformats.org/drawingml/2006/main" xmlns:r="http://schemas.openxmlformats.org/officeDocument/2006/relationships" xmlns:p="http://schemas.openxmlformats.org/presentationml/2006/main">
   <p:cSld>
     <p:spTree>
@@ -6759,7 +6122,7 @@
           <a:p>
             <a:fld id="{6700A58B-DD98-43D0-B791-721480A02982}" type="datetime1">
               <a:rPr lang="en-US" smtClean="0"/>
-              <a:t>11/25/24</a:t>
+              <a:t>4/28/25</a:t>
             </a:fld>
             <a:endParaRPr lang="en-US"/>
           </a:p>
@@ -6804,7 +6167,7 @@
           <a:p>
             <a:fld id="{37290FF7-652B-4475-AEAB-8B1A5D23AE09}" type="slidenum">
               <a:rPr lang="en-US" smtClean="0"/>
-              <a:t>7</a:t>
+              <a:t>6</a:t>
             </a:fld>
             <a:endParaRPr lang="en-US"/>
           </a:p>
@@ -8757,7 +8120,7 @@
 </p:sld>
 </file>
 
-<file path=ppt/slides/slide8.xml><?xml version="1.0" encoding="utf-8"?>
+<file path=ppt/slides/slide7.xml><?xml version="1.0" encoding="utf-8"?>
 <p:sld xmlns:a="http://schemas.openxmlformats.org/drawingml/2006/main" xmlns:r="http://schemas.openxmlformats.org/officeDocument/2006/relationships" xmlns:p="http://schemas.openxmlformats.org/presentationml/2006/main">
   <p:cSld>
     <p:spTree>
@@ -8791,7 +8154,7 @@
           <a:p>
             <a:fld id="{6700A58B-DD98-43D0-B791-721480A02982}" type="datetime1">
               <a:rPr lang="en-US" smtClean="0"/>
-              <a:t>11/25/24</a:t>
+              <a:t>4/28/25</a:t>
             </a:fld>
             <a:endParaRPr lang="en-US"/>
           </a:p>
@@ -8849,7 +8212,7 @@
           <a:p>
             <a:fld id="{37290FF7-652B-4475-AEAB-8B1A5D23AE09}" type="slidenum">
               <a:rPr lang="en-US" smtClean="0"/>
-              <a:t>8</a:t>
+              <a:t>7</a:t>
             </a:fld>
             <a:endParaRPr lang="en-US"/>
           </a:p>

</xml_diff>